<commit_message>
Added "Hold the date" to carousel.
</commit_message>
<xml_diff>
--- a/talks/2025-01-26-0930-notices.pptx
+++ b/talks/2025-01-26-0930-notices.pptx
@@ -18,6 +18,7 @@
     <p:sldId id="264" r:id="rId13"/>
     <p:sldId id="265" r:id="rId14"/>
     <p:sldId id="266" r:id="rId15"/>
+    <p:sldId id="267" r:id="rId16"/>
   </p:sldIdLst>
   <p:sldSz cx="9144000" cy="6858000"/>
   <p:notesSz cx="7559675" cy="10691813"/>
@@ -33,7 +34,7 @@
         <p:sld r:id="rId11"/>
         <p:sld r:id="rId12"/>
         <p:sld r:id="rId14"/>
-        <p:sld r:id="rId15"/>
+        <p:sld r:id="rId16"/>
       </p:sldLst>
     </p:custShow>
   </p:custShowLst>
@@ -91,7 +92,7 @@
         <p:txBody>
           <a:bodyPr/>
           <a:p>
-            <a:fld id="{CB1D811A-8585-40BB-9C47-65A12EEF7F4B}" type="slidenum">
+            <a:fld id="{F7C145D3-5A3E-4058-93BD-E26E8E0DD655}" type="slidenum">
               <a:t>&lt;#&gt;</a:t>
             </a:fld>
           </a:p>
@@ -279,7 +280,7 @@
         <p:txBody>
           <a:bodyPr/>
           <a:p>
-            <a:fld id="{E72A98E0-943E-4EF0-B0E3-58739803976D}" type="slidenum">
+            <a:fld id="{51C9A60C-F396-4629-B9ED-9C68F73212D7}" type="slidenum">
               <a:t>&lt;#&gt;</a:t>
             </a:fld>
           </a:p>
@@ -535,7 +536,7 @@
         <p:txBody>
           <a:bodyPr/>
           <a:p>
-            <a:fld id="{565CF995-521F-4376-9AD5-FA202823855E}" type="slidenum">
+            <a:fld id="{DC591E0C-4AEB-4F02-8C00-A1CF29F18D2B}" type="slidenum">
               <a:t>&lt;#&gt;</a:t>
             </a:fld>
           </a:p>
@@ -859,7 +860,7 @@
         <p:txBody>
           <a:bodyPr/>
           <a:p>
-            <a:fld id="{228C95FE-4AAE-4B51-AB47-87F98FA2EE93}" type="slidenum">
+            <a:fld id="{CFE51F50-33B1-467D-8C60-3237319FEF86}" type="slidenum">
               <a:t>&lt;#&gt;</a:t>
             </a:fld>
           </a:p>
@@ -942,7 +943,7 @@
         <p:txBody>
           <a:bodyPr/>
           <a:p>
-            <a:fld id="{07588E3E-6739-4687-8A82-0697FFF82948}" type="slidenum">
+            <a:fld id="{466FE2F6-4C7C-443A-BD0E-CFD9C9D3CE0D}" type="slidenum">
               <a:t>&lt;#&gt;</a:t>
             </a:fld>
           </a:p>
@@ -1099,7 +1100,7 @@
         <p:txBody>
           <a:bodyPr/>
           <a:p>
-            <a:fld id="{C48EB618-8669-4862-A647-D0B549005694}" type="slidenum">
+            <a:fld id="{FC8C0131-69AA-4E8F-AAE8-DB79B27BE689}" type="slidenum">
               <a:t>&lt;#&gt;</a:t>
             </a:fld>
           </a:p>
@@ -1253,7 +1254,7 @@
         <p:txBody>
           <a:bodyPr/>
           <a:p>
-            <a:fld id="{A28D0BF0-3214-4749-BB62-BD38494EEA97}" type="slidenum">
+            <a:fld id="{BA5E66E4-B877-48E7-B331-060B5E5566E9}" type="slidenum">
               <a:t>&lt;#&gt;</a:t>
             </a:fld>
           </a:p>
@@ -1441,7 +1442,7 @@
         <p:txBody>
           <a:bodyPr/>
           <a:p>
-            <a:fld id="{608BDEDB-C1D7-40C3-B81F-8EBB240AF810}" type="slidenum">
+            <a:fld id="{A59EA3E6-7FAA-436B-82D3-EFD0CC5B773B}" type="slidenum">
               <a:t>&lt;#&gt;</a:t>
             </a:fld>
           </a:p>
@@ -1561,7 +1562,7 @@
         <p:txBody>
           <a:bodyPr/>
           <a:p>
-            <a:fld id="{60564F42-8AC5-461B-8169-94FDAB7DA00E}" type="slidenum">
+            <a:fld id="{4A20DE98-66D4-4BF1-9652-467BF35BD3C2}" type="slidenum">
               <a:t>&lt;#&gt;</a:t>
             </a:fld>
           </a:p>
@@ -1681,7 +1682,7 @@
         <p:txBody>
           <a:bodyPr/>
           <a:p>
-            <a:fld id="{6D2A7657-3008-40C9-8DF9-E7FCE15F032F}" type="slidenum">
+            <a:fld id="{A8647E11-B336-4467-B1A2-BF304989C919}" type="slidenum">
               <a:t>&lt;#&gt;</a:t>
             </a:fld>
           </a:p>
@@ -1903,7 +1904,7 @@
         <p:txBody>
           <a:bodyPr/>
           <a:p>
-            <a:fld id="{70574A56-10B1-4490-B41F-D3CA97834C27}" type="slidenum">
+            <a:fld id="{360ED322-CBD1-4497-91F5-12FAE9F48A78}" type="slidenum">
               <a:t>&lt;#&gt;</a:t>
             </a:fld>
           </a:p>
@@ -2060,7 +2061,7 @@
         <p:txBody>
           <a:bodyPr/>
           <a:p>
-            <a:fld id="{87972B01-0DA5-4C05-897A-25C5B278623D}" type="slidenum">
+            <a:fld id="{9DB11DEE-D601-47E2-B9E9-BDC1A4496875}" type="slidenum">
               <a:t>&lt;#&gt;</a:t>
             </a:fld>
           </a:p>
@@ -2282,7 +2283,7 @@
         <p:txBody>
           <a:bodyPr/>
           <a:p>
-            <a:fld id="{CDE5EAC0-02AC-4493-9254-60515C0BEBC9}" type="slidenum">
+            <a:fld id="{27C670B2-3681-4EBF-BFBD-646ABF31AF6C}" type="slidenum">
               <a:t>&lt;#&gt;</a:t>
             </a:fld>
           </a:p>
@@ -2504,7 +2505,7 @@
         <p:txBody>
           <a:bodyPr/>
           <a:p>
-            <a:fld id="{A2996C3F-9754-4F8E-ACF9-C66706609AD8}" type="slidenum">
+            <a:fld id="{5D067579-7FC8-4775-B1CB-5EF46091BEB6}" type="slidenum">
               <a:t>&lt;#&gt;</a:t>
             </a:fld>
           </a:p>
@@ -2692,7 +2693,7 @@
         <p:txBody>
           <a:bodyPr/>
           <a:p>
-            <a:fld id="{756AA563-659C-4F9C-9E2C-2E200A768575}" type="slidenum">
+            <a:fld id="{B05EFF47-F1D3-4444-B0DA-658925FCBB7C}" type="slidenum">
               <a:t>&lt;#&gt;</a:t>
             </a:fld>
           </a:p>
@@ -2948,7 +2949,7 @@
         <p:txBody>
           <a:bodyPr/>
           <a:p>
-            <a:fld id="{003060C4-A263-4826-B026-D17CA8C0B4A3}" type="slidenum">
+            <a:fld id="{C333686D-C63D-48BC-893E-C52F80C0BD5B}" type="slidenum">
               <a:t>&lt;#&gt;</a:t>
             </a:fld>
           </a:p>
@@ -3272,7 +3273,7 @@
         <p:txBody>
           <a:bodyPr/>
           <a:p>
-            <a:fld id="{19A1F755-C29E-4DD6-A909-D30F330B5452}" type="slidenum">
+            <a:fld id="{FA8588D6-39E8-477F-9E49-9A09450EAED8}" type="slidenum">
               <a:t>&lt;#&gt;</a:t>
             </a:fld>
           </a:p>
@@ -3355,7 +3356,7 @@
         <p:txBody>
           <a:bodyPr/>
           <a:p>
-            <a:fld id="{7ADF89DE-BB53-4731-BC1E-CFBE1301CB83}" type="slidenum">
+            <a:fld id="{4548C1E2-B483-488F-AD20-AA0A5892CF74}" type="slidenum">
               <a:t>&lt;#&gt;</a:t>
             </a:fld>
           </a:p>
@@ -3512,7 +3513,7 @@
         <p:txBody>
           <a:bodyPr/>
           <a:p>
-            <a:fld id="{B1A59181-A77B-4363-8D7E-A832AB800867}" type="slidenum">
+            <a:fld id="{EE4110AC-AA26-4BE7-8290-2B69EAA52C43}" type="slidenum">
               <a:t>&lt;#&gt;</a:t>
             </a:fld>
           </a:p>
@@ -3666,7 +3667,7 @@
         <p:txBody>
           <a:bodyPr/>
           <a:p>
-            <a:fld id="{D5FA1730-75C1-4706-ADE8-C5492BB1A3A7}" type="slidenum">
+            <a:fld id="{A9676A97-A10F-4F0B-A160-425ABD2BD84E}" type="slidenum">
               <a:t>&lt;#&gt;</a:t>
             </a:fld>
           </a:p>
@@ -3854,7 +3855,7 @@
         <p:txBody>
           <a:bodyPr/>
           <a:p>
-            <a:fld id="{9DAD6BF5-D43C-4EEB-8E1B-C6091A9E962D}" type="slidenum">
+            <a:fld id="{DB590CAA-0579-4118-B9CD-3E7288F41A43}" type="slidenum">
               <a:t>&lt;#&gt;</a:t>
             </a:fld>
           </a:p>
@@ -3974,7 +3975,7 @@
         <p:txBody>
           <a:bodyPr/>
           <a:p>
-            <a:fld id="{79901074-7517-48D8-84B1-B39446CEE24E}" type="slidenum">
+            <a:fld id="{0AC6164D-FFD0-48C6-A7B6-55DD8D86003D}" type="slidenum">
               <a:t>&lt;#&gt;</a:t>
             </a:fld>
           </a:p>
@@ -4128,7 +4129,7 @@
         <p:txBody>
           <a:bodyPr/>
           <a:p>
-            <a:fld id="{BFEEC1AA-DF2B-4DB8-8BE3-625A8A872F7C}" type="slidenum">
+            <a:fld id="{5BDF4264-7330-4739-A133-E3AC0252E193}" type="slidenum">
               <a:t>&lt;#&gt;</a:t>
             </a:fld>
           </a:p>
@@ -4248,7 +4249,7 @@
         <p:txBody>
           <a:bodyPr/>
           <a:p>
-            <a:fld id="{0A47C5C6-060F-4819-A2C5-EBD93D953B95}" type="slidenum">
+            <a:fld id="{9EFC43B9-46A2-4811-BB96-AC93401E2460}" type="slidenum">
               <a:t>&lt;#&gt;</a:t>
             </a:fld>
           </a:p>
@@ -4470,7 +4471,7 @@
         <p:txBody>
           <a:bodyPr/>
           <a:p>
-            <a:fld id="{95760F37-CA4F-42B0-A660-1FC2D5E23EF4}" type="slidenum">
+            <a:fld id="{7986FAF7-69DB-4CA3-83AC-1D4ADB4EB28E}" type="slidenum">
               <a:t>&lt;#&gt;</a:t>
             </a:fld>
           </a:p>
@@ -4692,7 +4693,7 @@
         <p:txBody>
           <a:bodyPr/>
           <a:p>
-            <a:fld id="{8285159B-4AD8-40A8-971E-06F590C2207A}" type="slidenum">
+            <a:fld id="{C16257F7-671E-43BC-88A6-8AA1D871CD82}" type="slidenum">
               <a:t>&lt;#&gt;</a:t>
             </a:fld>
           </a:p>
@@ -4914,7 +4915,7 @@
         <p:txBody>
           <a:bodyPr/>
           <a:p>
-            <a:fld id="{80CF03DF-BE3C-46A4-8A4A-212925DA1F64}" type="slidenum">
+            <a:fld id="{462C0942-DB9F-4AB8-8ADB-2C86ED9F67D7}" type="slidenum">
               <a:t>&lt;#&gt;</a:t>
             </a:fld>
           </a:p>
@@ -5102,7 +5103,7 @@
         <p:txBody>
           <a:bodyPr/>
           <a:p>
-            <a:fld id="{82451478-0139-4287-B615-FBEB073BA4EC}" type="slidenum">
+            <a:fld id="{9068D6AF-ED8B-40F6-A913-B5E6490B8BFA}" type="slidenum">
               <a:t>&lt;#&gt;</a:t>
             </a:fld>
           </a:p>
@@ -5358,7 +5359,7 @@
         <p:txBody>
           <a:bodyPr/>
           <a:p>
-            <a:fld id="{E93F1897-3489-4629-9A33-662A3DF48E33}" type="slidenum">
+            <a:fld id="{9626DE90-FB3D-4D7E-A676-51DB8C3D2C06}" type="slidenum">
               <a:t>&lt;#&gt;</a:t>
             </a:fld>
           </a:p>
@@ -5682,7 +5683,7 @@
         <p:txBody>
           <a:bodyPr/>
           <a:p>
-            <a:fld id="{699EA6C8-62A8-4418-8F8D-701A4D853F58}" type="slidenum">
+            <a:fld id="{855FADB9-8ED6-4D1F-A572-B8160489E675}" type="slidenum">
               <a:t>&lt;#&gt;</a:t>
             </a:fld>
           </a:p>
@@ -5870,7 +5871,7 @@
         <p:txBody>
           <a:bodyPr/>
           <a:p>
-            <a:fld id="{31EDBC62-BE2F-4F04-B0E1-60F3160BE22E}" type="slidenum">
+            <a:fld id="{43153D2E-394A-4E56-BAFD-3CC6B987F404}" type="slidenum">
               <a:t>&lt;#&gt;</a:t>
             </a:fld>
           </a:p>
@@ -5990,7 +5991,7 @@
         <p:txBody>
           <a:bodyPr/>
           <a:p>
-            <a:fld id="{344BDBAC-F94B-49A0-A14D-B7DE7D4FAEB9}" type="slidenum">
+            <a:fld id="{5B4DF91A-1CC1-4A56-9F87-852F1D5FD1E0}" type="slidenum">
               <a:t>&lt;#&gt;</a:t>
             </a:fld>
           </a:p>
@@ -6110,7 +6111,7 @@
         <p:txBody>
           <a:bodyPr/>
           <a:p>
-            <a:fld id="{437F2C41-C9CF-42D8-ACDF-022ADD40684D}" type="slidenum">
+            <a:fld id="{880A9DA9-2A1E-46D2-9F62-16731FAE70C6}" type="slidenum">
               <a:t>&lt;#&gt;</a:t>
             </a:fld>
           </a:p>
@@ -6332,7 +6333,7 @@
         <p:txBody>
           <a:bodyPr/>
           <a:p>
-            <a:fld id="{1E70F882-821D-43EA-85E0-1F9FD7C06FED}" type="slidenum">
+            <a:fld id="{65F5B103-75C1-4BC7-B9AD-34659DB819B2}" type="slidenum">
               <a:t>&lt;#&gt;</a:t>
             </a:fld>
           </a:p>
@@ -6554,7 +6555,7 @@
         <p:txBody>
           <a:bodyPr/>
           <a:p>
-            <a:fld id="{B273A8D7-A5DD-4FCC-9A2E-207A3F029C81}" type="slidenum">
+            <a:fld id="{2EE322E5-572F-4A47-94DA-9D3264F5CAF6}" type="slidenum">
               <a:t>&lt;#&gt;</a:t>
             </a:fld>
           </a:p>
@@ -6776,7 +6777,7 @@
         <p:txBody>
           <a:bodyPr/>
           <a:p>
-            <a:fld id="{07DFA47E-1FE4-47AC-AC05-97518ADFCA69}" type="slidenum">
+            <a:fld id="{7BF1B4F8-CAAD-40BE-AD30-8F6D4D010A5F}" type="slidenum">
               <a:t>&lt;#&gt;</a:t>
             </a:fld>
           </a:p>
@@ -6845,7 +6846,7 @@
         <p:spPr>
           <a:xfrm>
             <a:off x="3124080" y="6355800"/>
-            <a:ext cx="2887560" cy="357120"/>
+            <a:ext cx="2887200" cy="356760"/>
           </a:xfrm>
           <a:prstGeom prst="rect">
             <a:avLst/>
@@ -6881,7 +6882,7 @@
               <a:rPr b="0" lang="en-GB" sz="1400" spc="-1" strike="noStrike">
                 <a:latin typeface="Times New Roman"/>
               </a:rPr>
-              <a:t> </a:t>
+              <a:t>&lt;footer&gt;</a:t>
             </a:r>
             <a:endParaRPr b="0" lang="en-GB" sz="1400" spc="-1" strike="noStrike">
               <a:latin typeface="Times New Roman"/>
@@ -6902,7 +6903,7 @@
         <p:spPr>
           <a:xfrm>
             <a:off x="6553080" y="6355800"/>
-            <a:ext cx="2125800" cy="357120"/>
+            <a:ext cx="2125440" cy="356760"/>
           </a:xfrm>
           <a:prstGeom prst="rect">
             <a:avLst/>
@@ -6937,14 +6938,14 @@
               </a:lnSpc>
               <a:buNone/>
             </a:pPr>
-            <a:fld id="{415EFEE7-CB30-41B6-85B5-E2064C18FB19}" type="slidenum">
+            <a:fld id="{CFAE30D8-4FD9-4CB9-81D1-1C335F699649}" type="slidenum">
               <a:rPr b="0" lang="en-US" sz="900" spc="-1" strike="noStrike">
                 <a:solidFill>
                   <a:srgbClr val="8b8b8b"/>
                 </a:solidFill>
                 <a:latin typeface="Calibri"/>
               </a:rPr>
-              <a:t>8</a:t>
+              <a:t>&lt;number&gt;</a:t>
             </a:fld>
             <a:endParaRPr b="0" lang="en-GB" sz="900" spc="-1" strike="noStrike">
               <a:latin typeface="Times New Roman"/>
@@ -6965,7 +6966,7 @@
         <p:spPr>
           <a:xfrm>
             <a:off x="457200" y="6355800"/>
-            <a:ext cx="2125800" cy="357120"/>
+            <a:ext cx="2125440" cy="356760"/>
           </a:xfrm>
           <a:prstGeom prst="rect">
             <a:avLst/>
@@ -6991,7 +6992,7 @@
               <a:rPr b="0" lang="en-GB" sz="1400" spc="-1" strike="noStrike">
                 <a:latin typeface="Times New Roman"/>
               </a:rPr>
-              <a:t> </a:t>
+              <a:t>&lt;date/time&gt;</a:t>
             </a:r>
             <a:endParaRPr b="0" lang="en-GB" sz="1400" spc="-1" strike="noStrike">
               <a:latin typeface="Times New Roman"/>
@@ -7282,7 +7283,7 @@
         <p:spPr>
           <a:xfrm>
             <a:off x="3124080" y="6355800"/>
-            <a:ext cx="2887560" cy="357120"/>
+            <a:ext cx="2887200" cy="356760"/>
           </a:xfrm>
           <a:prstGeom prst="rect">
             <a:avLst/>
@@ -7339,7 +7340,7 @@
         <p:spPr>
           <a:xfrm>
             <a:off x="6553080" y="6355800"/>
-            <a:ext cx="2125800" cy="357120"/>
+            <a:ext cx="2125440" cy="356760"/>
           </a:xfrm>
           <a:prstGeom prst="rect">
             <a:avLst/>
@@ -7374,7 +7375,7 @@
               </a:lnSpc>
               <a:buNone/>
             </a:pPr>
-            <a:fld id="{9C5FD741-9291-428F-935A-CE0D64257A11}" type="slidenum">
+            <a:fld id="{BD2B6C8F-0545-45F9-BB35-C97E7D2D181C}" type="slidenum">
               <a:rPr b="0" lang="en-US" sz="900" spc="-1" strike="noStrike">
                 <a:solidFill>
                   <a:srgbClr val="8b8b8b"/>
@@ -7402,7 +7403,7 @@
         <p:spPr>
           <a:xfrm>
             <a:off x="457200" y="6355800"/>
-            <a:ext cx="2125800" cy="357120"/>
+            <a:ext cx="2125440" cy="356760"/>
           </a:xfrm>
           <a:prstGeom prst="rect">
             <a:avLst/>
@@ -7719,7 +7720,7 @@
         <p:spPr>
           <a:xfrm>
             <a:off x="3029040" y="6356520"/>
-            <a:ext cx="3080520" cy="359280"/>
+            <a:ext cx="3080160" cy="358920"/>
           </a:xfrm>
           <a:prstGeom prst="rect">
             <a:avLst/>
@@ -7776,7 +7777,7 @@
         <p:spPr>
           <a:xfrm>
             <a:off x="6458040" y="6356520"/>
-            <a:ext cx="2051640" cy="359280"/>
+            <a:ext cx="2051280" cy="358920"/>
           </a:xfrm>
           <a:prstGeom prst="rect">
             <a:avLst/>
@@ -7818,7 +7819,7 @@
                 <a:tab algn="l" pos="0"/>
               </a:tabLst>
             </a:pPr>
-            <a:fld id="{2C473105-8CC3-4B76-B123-1C87F27ACD2E}" type="slidenum">
+            <a:fld id="{4DFC2EF2-579F-4542-9704-F877C2F3E52D}" type="slidenum">
               <a:rPr b="0" lang="en-US" sz="1200" spc="-1" strike="noStrike">
                 <a:solidFill>
                   <a:srgbClr val="757575"/>
@@ -7847,7 +7848,7 @@
         <p:spPr>
           <a:xfrm>
             <a:off x="628560" y="6356520"/>
-            <a:ext cx="2051640" cy="359280"/>
+            <a:ext cx="2051280" cy="358920"/>
           </a:xfrm>
           <a:prstGeom prst="rect">
             <a:avLst/>
@@ -8165,7 +8166,7 @@
         <p:spPr>
           <a:xfrm>
             <a:off x="1371600" y="3885840"/>
-            <a:ext cx="6392880" cy="1744200"/>
+            <a:ext cx="6392520" cy="1743840"/>
           </a:xfrm>
           <a:prstGeom prst="rect">
             <a:avLst/>
@@ -8213,7 +8214,7 @@
         <p:spPr>
           <a:xfrm>
             <a:off x="3060000" y="5940000"/>
-            <a:ext cx="3489120" cy="652680"/>
+            <a:ext cx="3488760" cy="652320"/>
           </a:xfrm>
           <a:prstGeom prst="rect">
             <a:avLst/>
@@ -8299,7 +8300,7 @@
         <p:spPr>
           <a:xfrm>
             <a:off x="0" y="0"/>
-            <a:ext cx="9138240" cy="6852240"/>
+            <a:ext cx="9137880" cy="6851880"/>
           </a:xfrm>
           <a:prstGeom prst="rect">
             <a:avLst/>
@@ -8318,7 +8319,7 @@
         <p:spPr>
           <a:xfrm>
             <a:off x="8280720" y="6460200"/>
-            <a:ext cx="493200" cy="341640"/>
+            <a:ext cx="492840" cy="341280"/>
           </a:xfrm>
           <a:prstGeom prst="rect">
             <a:avLst/>
@@ -8412,7 +8413,7 @@
         <p:spPr>
           <a:xfrm>
             <a:off x="0" y="0"/>
-            <a:ext cx="9177840" cy="6297840"/>
+            <a:ext cx="9177480" cy="6297480"/>
           </a:xfrm>
           <a:prstGeom prst="rect">
             <a:avLst/>
@@ -8575,7 +8576,265 @@
         <p:spPr>
           <a:xfrm>
             <a:off x="8280720" y="6460200"/>
-            <a:ext cx="493200" cy="341640"/>
+            <a:ext cx="492840" cy="341280"/>
+          </a:xfrm>
+          <a:prstGeom prst="rect">
+            <a:avLst/>
+          </a:prstGeom>
+          <a:noFill/>
+          <a:ln w="0">
+            <a:noFill/>
+          </a:ln>
+        </p:spPr>
+        <p:style>
+          <a:lnRef idx="0"/>
+          <a:fillRef idx="0"/>
+          <a:effectRef idx="0"/>
+          <a:fontRef idx="minor"/>
+        </p:style>
+        <p:txBody>
+          <a:bodyPr lIns="90000" rIns="90000" tIns="45000" bIns="45000" anchor="t">
+            <a:noAutofit/>
+          </a:bodyPr>
+          <a:p>
+            <a:pPr>
+              <a:lnSpc>
+                <a:spcPct val="100000"/>
+              </a:lnSpc>
+              <a:buNone/>
+            </a:pPr>
+            <a:r>
+              <a:rPr b="0" lang="en-GB" sz="1000" spc="-1" strike="noStrike">
+                <a:solidFill>
+                  <a:srgbClr val="ffffd7"/>
+                </a:solidFill>
+                <a:latin typeface="Arial"/>
+                <a:ea typeface="DejaVu Sans"/>
+              </a:rPr>
+              <a:t>B</a:t>
+            </a:r>
+            <a:endParaRPr b="0" lang="en-GB" sz="1000" spc="-1" strike="noStrike">
+              <a:latin typeface="Arial"/>
+            </a:endParaRPr>
+          </a:p>
+        </p:txBody>
+      </p:sp>
+    </p:spTree>
+  </p:cSld>
+  <mc:AlternateContent>
+    <mc:Choice Requires="p14">
+      <p:transition spd="slow" advTm="5000" p14:dur="2000"/>
+    </mc:Choice>
+    <mc:Fallback>
+      <p:transition spd="slow" advTm="5000"/>
+    </mc:Fallback>
+  </mc:AlternateContent>
+</p:sld>
+</file>
+
+<file path=ppt/slides/slide12.xml><?xml version="1.0" encoding="utf-8"?>
+<p:sld xmlns:a="http://schemas.openxmlformats.org/drawingml/2006/main" xmlns:p="http://schemas.openxmlformats.org/presentationml/2006/main" xmlns:r="http://schemas.openxmlformats.org/officeDocument/2006/relationships" xmlns:p14="http://schemas.microsoft.com/office/powerpoint/2010/main" xmlns:p15="http://schemas.microsoft.com/office/powerpoint/2012/main" xmlns:mc="http://schemas.openxmlformats.org/markup-compatibility/2006">
+  <p:cSld>
+    <p:bg>
+      <p:bgPr>
+        <a:blipFill rotWithShape="0">
+          <a:blip r:embed="rId1"/>
+          <a:tile/>
+        </a:blipFill>
+      </p:bgPr>
+    </p:bg>
+    <p:spTree>
+      <p:nvGrpSpPr>
+        <p:cNvPr id="1" name=""/>
+        <p:cNvGrpSpPr/>
+        <p:nvPr/>
+      </p:nvGrpSpPr>
+      <p:grpSpPr>
+        <a:xfrm>
+          <a:off x="0" y="0"/>
+          <a:ext cx="0" cy="0"/>
+          <a:chOff x="0" y="0"/>
+          <a:chExt cx="0" cy="0"/>
+        </a:xfrm>
+      </p:grpSpPr>
+      <p:sp>
+        <p:nvSpPr>
+          <p:cNvPr id="152" name="PlaceHolder 1"/>
+          <p:cNvSpPr>
+            <a:spLocks noGrp="1"/>
+          </p:cNvSpPr>
+          <p:nvPr>
+            <p:ph/>
+          </p:nvPr>
+        </p:nvSpPr>
+        <p:spPr>
+          <a:xfrm>
+            <a:off x="0" y="0"/>
+            <a:ext cx="9177480" cy="6297480"/>
+          </a:xfrm>
+          <a:prstGeom prst="rect">
+            <a:avLst/>
+          </a:prstGeom>
+          <a:noFill/>
+          <a:ln w="0">
+            <a:noFill/>
+          </a:ln>
+        </p:spPr>
+        <p:txBody>
+          <a:bodyPr lIns="90000" rIns="90000" tIns="45000" bIns="45000" anchor="t">
+            <a:noAutofit/>
+          </a:bodyPr>
+          <a:p>
+            <a:pPr>
+              <a:lnSpc>
+                <a:spcPct val="100000"/>
+              </a:lnSpc>
+              <a:spcBef>
+                <a:spcPts val="479"/>
+              </a:spcBef>
+              <a:buNone/>
+              <a:tabLst>
+                <a:tab algn="l" pos="0"/>
+              </a:tabLst>
+            </a:pPr>
+            <a:r>
+              <a:rPr b="0" lang="en-US" sz="4000" spc="-1" strike="noStrike">
+                <a:solidFill>
+                  <a:srgbClr val="ffe994"/>
+                </a:solidFill>
+                <a:latin typeface="Calibri"/>
+              </a:rPr>
+              <a:t>Notices:</a:t>
+            </a:r>
+            <a:endParaRPr b="0" lang="en-GB" sz="4000" spc="-1" strike="noStrike">
+              <a:latin typeface="Arial"/>
+            </a:endParaRPr>
+          </a:p>
+          <a:p>
+            <a:pPr>
+              <a:lnSpc>
+                <a:spcPct val="100000"/>
+              </a:lnSpc>
+              <a:spcBef>
+                <a:spcPts val="479"/>
+              </a:spcBef>
+              <a:buNone/>
+              <a:tabLst>
+                <a:tab algn="l" pos="0"/>
+              </a:tabLst>
+            </a:pPr>
+            <a:r>
+              <a:rPr b="0" lang="en-US" sz="4000" spc="-1" strike="noStrike">
+                <a:solidFill>
+                  <a:srgbClr val="ffe994"/>
+                </a:solidFill>
+                <a:latin typeface="Calibri"/>
+              </a:rPr>
+              <a:t>Hold the date! </a:t>
+            </a:r>
+            <a:endParaRPr b="0" lang="en-GB" sz="4000" spc="-1" strike="noStrike">
+              <a:latin typeface="Arial"/>
+            </a:endParaRPr>
+          </a:p>
+          <a:p>
+            <a:pPr>
+              <a:lnSpc>
+                <a:spcPct val="100000"/>
+              </a:lnSpc>
+              <a:spcBef>
+                <a:spcPts val="479"/>
+              </a:spcBef>
+              <a:buNone/>
+              <a:tabLst>
+                <a:tab algn="l" pos="0"/>
+              </a:tabLst>
+            </a:pPr>
+            <a:endParaRPr b="0" lang="en-GB" sz="4000" spc="-1" strike="noStrike">
+              <a:latin typeface="Arial"/>
+            </a:endParaRPr>
+          </a:p>
+          <a:p>
+            <a:pPr>
+              <a:lnSpc>
+                <a:spcPct val="100000"/>
+              </a:lnSpc>
+              <a:spcBef>
+                <a:spcPts val="479"/>
+              </a:spcBef>
+              <a:buNone/>
+              <a:tabLst>
+                <a:tab algn="l" pos="0"/>
+              </a:tabLst>
+            </a:pPr>
+            <a:r>
+              <a:rPr b="0" lang="en-US" sz="4000" spc="-1" strike="noStrike">
+                <a:solidFill>
+                  <a:srgbClr val="ffe994"/>
+                </a:solidFill>
+                <a:latin typeface="Calibri"/>
+              </a:rPr>
+              <a:t>Next meeting in the 0930 forum series:</a:t>
+            </a:r>
+            <a:endParaRPr b="0" lang="en-GB" sz="4000" spc="-1" strike="noStrike">
+              <a:latin typeface="Arial"/>
+            </a:endParaRPr>
+          </a:p>
+          <a:p>
+            <a:pPr>
+              <a:lnSpc>
+                <a:spcPct val="100000"/>
+              </a:lnSpc>
+              <a:spcBef>
+                <a:spcPts val="479"/>
+              </a:spcBef>
+              <a:buNone/>
+              <a:tabLst>
+                <a:tab algn="l" pos="0"/>
+              </a:tabLst>
+            </a:pPr>
+            <a:r>
+              <a:rPr b="0" lang="en-US" sz="4000" spc="-1" strike="noStrike">
+                <a:solidFill>
+                  <a:srgbClr val="ffe994"/>
+                </a:solidFill>
+                <a:latin typeface="Calibri"/>
+              </a:rPr>
+              <a:t>17</a:t>
+            </a:r>
+            <a:r>
+              <a:rPr b="0" lang="en-US" sz="4000" spc="-1" strike="noStrike" baseline="33000">
+                <a:solidFill>
+                  <a:srgbClr val="ffe994"/>
+                </a:solidFill>
+                <a:latin typeface="Calibri"/>
+              </a:rPr>
+              <a:t>th</a:t>
+            </a:r>
+            <a:r>
+              <a:rPr b="0" lang="en-US" sz="4000" spc="-1" strike="noStrike">
+                <a:solidFill>
+                  <a:srgbClr val="ffe994"/>
+                </a:solidFill>
+                <a:latin typeface="Calibri"/>
+              </a:rPr>
+              <a:t> February.   </a:t>
+            </a:r>
+            <a:endParaRPr b="0" lang="en-GB" sz="4000" spc="-1" strike="noStrike">
+              <a:latin typeface="Arial"/>
+            </a:endParaRPr>
+          </a:p>
+        </p:txBody>
+      </p:sp>
+      <p:sp>
+        <p:nvSpPr>
+          <p:cNvPr id="153" name=""/>
+          <p:cNvSpPr/>
+          <p:nvPr/>
+        </p:nvSpPr>
+        <p:spPr>
+          <a:xfrm>
+            <a:off x="8280720" y="6460200"/>
+            <a:ext cx="492840" cy="341280"/>
           </a:xfrm>
           <a:prstGeom prst="rect">
             <a:avLst/>
@@ -8669,7 +8928,7 @@
         <p:spPr>
           <a:xfrm>
             <a:off x="457200" y="274320"/>
-            <a:ext cx="8221680" cy="1134720"/>
+            <a:ext cx="8221320" cy="1134360"/>
           </a:xfrm>
           <a:prstGeom prst="rect">
             <a:avLst/>
@@ -8721,7 +8980,7 @@
         <p:spPr>
           <a:xfrm>
             <a:off x="457200" y="1620000"/>
-            <a:ext cx="8221680" cy="3056760"/>
+            <a:ext cx="8221320" cy="3056400"/>
           </a:xfrm>
           <a:prstGeom prst="rect">
             <a:avLst/>
@@ -8892,7 +9151,7 @@
         <p:spPr>
           <a:xfrm>
             <a:off x="457560" y="4860000"/>
-            <a:ext cx="8221680" cy="1289160"/>
+            <a:ext cx="8221320" cy="1288800"/>
           </a:xfrm>
           <a:prstGeom prst="rect">
             <a:avLst/>
@@ -8966,7 +9225,7 @@
         <p:spPr>
           <a:xfrm>
             <a:off x="8280720" y="6460200"/>
-            <a:ext cx="493200" cy="341640"/>
+            <a:ext cx="492840" cy="341280"/>
           </a:xfrm>
           <a:prstGeom prst="rect">
             <a:avLst/>
@@ -9022,7 +9281,7 @@
         <p:spPr>
           <a:xfrm>
             <a:off x="6300000" y="2880000"/>
-            <a:ext cx="2519280" cy="2519280"/>
+            <a:ext cx="2518920" cy="2518920"/>
           </a:xfrm>
           <a:prstGeom prst="rect">
             <a:avLst/>
@@ -9083,7 +9342,7 @@
         <p:spPr>
           <a:xfrm>
             <a:off x="0" y="0"/>
-            <a:ext cx="9177840" cy="6297840"/>
+            <a:ext cx="9177480" cy="6297480"/>
           </a:xfrm>
           <a:prstGeom prst="rect">
             <a:avLst/>
@@ -9264,7 +9523,7 @@
         <p:spPr>
           <a:xfrm>
             <a:off x="8280720" y="6460200"/>
-            <a:ext cx="493200" cy="341640"/>
+            <a:ext cx="492840" cy="341280"/>
           </a:xfrm>
           <a:prstGeom prst="rect">
             <a:avLst/>
@@ -9358,7 +9617,7 @@
         <p:spPr>
           <a:xfrm>
             <a:off x="0" y="0"/>
-            <a:ext cx="9177840" cy="6297840"/>
+            <a:ext cx="9177480" cy="6297480"/>
           </a:xfrm>
           <a:prstGeom prst="rect">
             <a:avLst/>
@@ -9409,7 +9668,7 @@
         <p:spPr>
           <a:xfrm>
             <a:off x="8280720" y="6460200"/>
-            <a:ext cx="493200" cy="341640"/>
+            <a:ext cx="492840" cy="341280"/>
           </a:xfrm>
           <a:prstGeom prst="rect">
             <a:avLst/>
@@ -9465,7 +9724,7 @@
         <p:spPr>
           <a:xfrm>
             <a:off x="2141640" y="-11160"/>
-            <a:ext cx="4847760" cy="6855480"/>
+            <a:ext cx="4847400" cy="6855120"/>
           </a:xfrm>
           <a:prstGeom prst="rect">
             <a:avLst/>
@@ -9526,7 +9785,7 @@
         <p:spPr>
           <a:xfrm>
             <a:off x="0" y="0"/>
-            <a:ext cx="9177840" cy="6297840"/>
+            <a:ext cx="9177480" cy="6297480"/>
           </a:xfrm>
           <a:prstGeom prst="rect">
             <a:avLst/>
@@ -9658,7 +9917,7 @@
         <p:spPr>
           <a:xfrm>
             <a:off x="8280720" y="6460200"/>
-            <a:ext cx="493200" cy="341640"/>
+            <a:ext cx="492840" cy="341280"/>
           </a:xfrm>
           <a:prstGeom prst="rect">
             <a:avLst/>
@@ -9752,7 +10011,7 @@
         <p:spPr>
           <a:xfrm>
             <a:off x="0" y="0"/>
-            <a:ext cx="9177840" cy="6297840"/>
+            <a:ext cx="9177480" cy="6297480"/>
           </a:xfrm>
           <a:prstGeom prst="rect">
             <a:avLst/>
@@ -9803,7 +10062,7 @@
         <p:spPr>
           <a:xfrm>
             <a:off x="8280720" y="6460200"/>
-            <a:ext cx="493200" cy="341640"/>
+            <a:ext cx="492840" cy="341280"/>
           </a:xfrm>
           <a:prstGeom prst="rect">
             <a:avLst/>
@@ -9859,7 +10118,7 @@
         <p:spPr>
           <a:xfrm>
             <a:off x="730800" y="1080000"/>
-            <a:ext cx="7680600" cy="5037840"/>
+            <a:ext cx="7680240" cy="5037480"/>
           </a:xfrm>
           <a:prstGeom prst="rect">
             <a:avLst/>
@@ -9920,7 +10179,7 @@
         <p:spPr>
           <a:xfrm>
             <a:off x="0" y="0"/>
-            <a:ext cx="9177840" cy="6297840"/>
+            <a:ext cx="9177480" cy="6297480"/>
           </a:xfrm>
           <a:prstGeom prst="rect">
             <a:avLst/>
@@ -10252,7 +10511,7 @@
         <p:spPr>
           <a:xfrm>
             <a:off x="8280720" y="6460200"/>
-            <a:ext cx="493200" cy="341640"/>
+            <a:ext cx="492840" cy="341280"/>
           </a:xfrm>
           <a:prstGeom prst="rect">
             <a:avLst/>
@@ -10346,7 +10605,7 @@
         <p:spPr>
           <a:xfrm>
             <a:off x="0" y="0"/>
-            <a:ext cx="9177840" cy="6297840"/>
+            <a:ext cx="9177480" cy="6297480"/>
           </a:xfrm>
           <a:prstGeom prst="rect">
             <a:avLst/>
@@ -10542,7 +10801,7 @@
         <p:spPr>
           <a:xfrm>
             <a:off x="8280720" y="6460200"/>
-            <a:ext cx="493200" cy="341640"/>
+            <a:ext cx="492840" cy="341280"/>
           </a:xfrm>
           <a:prstGeom prst="rect">
             <a:avLst/>
@@ -10598,7 +10857,7 @@
         <p:spPr>
           <a:xfrm>
             <a:off x="1818720" y="900000"/>
-            <a:ext cx="5505480" cy="4130280"/>
+            <a:ext cx="5505120" cy="4129920"/>
           </a:xfrm>
           <a:prstGeom prst="rect">
             <a:avLst/>
@@ -10659,7 +10918,7 @@
         <p:spPr>
           <a:xfrm>
             <a:off x="0" y="0"/>
-            <a:ext cx="5038920" cy="6856920"/>
+            <a:ext cx="5038560" cy="6856560"/>
           </a:xfrm>
           <a:prstGeom prst="rect">
             <a:avLst/>
@@ -10796,7 +11055,7 @@
         <p:spPr>
           <a:xfrm>
             <a:off x="8280720" y="6460200"/>
-            <a:ext cx="493200" cy="341640"/>
+            <a:ext cx="492840" cy="341280"/>
           </a:xfrm>
           <a:prstGeom prst="rect">
             <a:avLst/>
@@ -10852,7 +11111,7 @@
         <p:spPr>
           <a:xfrm>
             <a:off x="5040000" y="1440000"/>
-            <a:ext cx="3943800" cy="5258880"/>
+            <a:ext cx="3943440" cy="5258520"/>
           </a:xfrm>
           <a:prstGeom prst="rect">
             <a:avLst/>

</xml_diff>